<commit_message>
HtmlUi: Small updated for wizard PPT
</commit_message>
<xml_diff>
--- a/org.eclipse.scout.rt.ui.html.parent/org.eclipse.scout.rt.ui.html/docs/ui_design/Wizard (Neu).pptx
+++ b/org.eclipse.scout.rt.ui.html.parent/org.eclipse.scout.rt.ui.html/docs/ui_design/Wizard (Neu).pptx
@@ -329,7 +329,7 @@
           <a:p>
             <a:fld id="{7F49D355-16BD-4E45-BD9A-5EA878CF7CBD}" type="datetimeFigureOut">
               <a:rPr lang="it-IT" smtClean="0"/>
-              <a:t>25/02/2015</a:t>
+              <a:t>27/02/2015</a:t>
             </a:fld>
             <a:endParaRPr lang="it-IT"/>
           </a:p>
@@ -494,7 +494,7 @@
           <a:p>
             <a:fld id="{7F49D355-16BD-4E45-BD9A-5EA878CF7CBD}" type="datetimeFigureOut">
               <a:rPr lang="it-IT" smtClean="0"/>
-              <a:t>25/02/2015</a:t>
+              <a:t>27/02/2015</a:t>
             </a:fld>
             <a:endParaRPr lang="it-IT"/>
           </a:p>
@@ -669,7 +669,7 @@
           <a:p>
             <a:fld id="{7F49D355-16BD-4E45-BD9A-5EA878CF7CBD}" type="datetimeFigureOut">
               <a:rPr lang="it-IT" smtClean="0"/>
-              <a:t>25/02/2015</a:t>
+              <a:t>27/02/2015</a:t>
             </a:fld>
             <a:endParaRPr lang="it-IT"/>
           </a:p>
@@ -834,7 +834,7 @@
           <a:p>
             <a:fld id="{7F49D355-16BD-4E45-BD9A-5EA878CF7CBD}" type="datetimeFigureOut">
               <a:rPr lang="it-IT" smtClean="0"/>
-              <a:t>25/02/2015</a:t>
+              <a:t>27/02/2015</a:t>
             </a:fld>
             <a:endParaRPr lang="it-IT"/>
           </a:p>
@@ -1075,7 +1075,7 @@
           <a:p>
             <a:fld id="{7F49D355-16BD-4E45-BD9A-5EA878CF7CBD}" type="datetimeFigureOut">
               <a:rPr lang="it-IT" smtClean="0"/>
-              <a:t>25/02/2015</a:t>
+              <a:t>27/02/2015</a:t>
             </a:fld>
             <a:endParaRPr lang="it-IT"/>
           </a:p>
@@ -1358,7 +1358,7 @@
           <a:p>
             <a:fld id="{7F49D355-16BD-4E45-BD9A-5EA878CF7CBD}" type="datetimeFigureOut">
               <a:rPr lang="it-IT" smtClean="0"/>
-              <a:t>25/02/2015</a:t>
+              <a:t>27/02/2015</a:t>
             </a:fld>
             <a:endParaRPr lang="it-IT"/>
           </a:p>
@@ -1775,7 +1775,7 @@
           <a:p>
             <a:fld id="{7F49D355-16BD-4E45-BD9A-5EA878CF7CBD}" type="datetimeFigureOut">
               <a:rPr lang="it-IT" smtClean="0"/>
-              <a:t>25/02/2015</a:t>
+              <a:t>27/02/2015</a:t>
             </a:fld>
             <a:endParaRPr lang="it-IT"/>
           </a:p>
@@ -1888,7 +1888,7 @@
           <a:p>
             <a:fld id="{7F49D355-16BD-4E45-BD9A-5EA878CF7CBD}" type="datetimeFigureOut">
               <a:rPr lang="it-IT" smtClean="0"/>
-              <a:t>25/02/2015</a:t>
+              <a:t>27/02/2015</a:t>
             </a:fld>
             <a:endParaRPr lang="it-IT"/>
           </a:p>
@@ -1978,7 +1978,7 @@
           <a:p>
             <a:fld id="{7F49D355-16BD-4E45-BD9A-5EA878CF7CBD}" type="datetimeFigureOut">
               <a:rPr lang="it-IT" smtClean="0"/>
-              <a:t>25/02/2015</a:t>
+              <a:t>27/02/2015</a:t>
             </a:fld>
             <a:endParaRPr lang="it-IT"/>
           </a:p>
@@ -2250,7 +2250,7 @@
           <a:p>
             <a:fld id="{7F49D355-16BD-4E45-BD9A-5EA878CF7CBD}" type="datetimeFigureOut">
               <a:rPr lang="it-IT" smtClean="0"/>
-              <a:t>25/02/2015</a:t>
+              <a:t>27/02/2015</a:t>
             </a:fld>
             <a:endParaRPr lang="it-IT"/>
           </a:p>
@@ -2498,7 +2498,7 @@
           <a:p>
             <a:fld id="{7F49D355-16BD-4E45-BD9A-5EA878CF7CBD}" type="datetimeFigureOut">
               <a:rPr lang="it-IT" smtClean="0"/>
-              <a:t>25/02/2015</a:t>
+              <a:t>27/02/2015</a:t>
             </a:fld>
             <a:endParaRPr lang="it-IT"/>
           </a:p>
@@ -2706,7 +2706,7 @@
           <a:p>
             <a:fld id="{7F49D355-16BD-4E45-BD9A-5EA878CF7CBD}" type="datetimeFigureOut">
               <a:rPr lang="it-IT" smtClean="0"/>
-              <a:t>25/02/2015</a:t>
+              <a:t>27/02/2015</a:t>
             </a:fld>
             <a:endParaRPr lang="it-IT"/>
           </a:p>
@@ -5737,10 +5737,6 @@
               </a:rPr>
               <a:t>Vorlage für neues UI-Design</a:t>
             </a:r>
-            <a:endParaRPr lang="de-CH" sz="1500" dirty="0">
-              <a:latin typeface="Arial" panose="020B0604020202020204" pitchFamily="34" charset="0"/>
-              <a:cs typeface="Arial" panose="020B0604020202020204" pitchFamily="34" charset="0"/>
-            </a:endParaRPr>
           </a:p>
         </p:txBody>
       </p:sp>
@@ -34409,6 +34405,70 @@
           </a:p>
         </p:txBody>
       </p:sp>
+      <p:sp>
+        <p:nvSpPr>
+          <p:cNvPr id="43" name="Abgerundetes Rechteck 42"/>
+          <p:cNvSpPr/>
+          <p:nvPr/>
+        </p:nvSpPr>
+        <p:spPr>
+          <a:xfrm>
+            <a:off x="8687361" y="4219514"/>
+            <a:ext cx="2652497" cy="432048"/>
+          </a:xfrm>
+          <a:prstGeom prst="roundRect">
+            <a:avLst>
+              <a:gd name="adj" fmla="val 7849"/>
+            </a:avLst>
+          </a:prstGeom>
+          <a:solidFill>
+            <a:srgbClr val="EFEFEF"/>
+          </a:solidFill>
+          <a:ln w="12700">
+            <a:solidFill>
+              <a:srgbClr val="CCCCCC"/>
+            </a:solidFill>
+          </a:ln>
+        </p:spPr>
+        <p:style>
+          <a:lnRef idx="2">
+            <a:schemeClr val="accent1">
+              <a:shade val="50000"/>
+            </a:schemeClr>
+          </a:lnRef>
+          <a:fillRef idx="1">
+            <a:schemeClr val="accent1"/>
+          </a:fillRef>
+          <a:effectRef idx="0">
+            <a:schemeClr val="accent1"/>
+          </a:effectRef>
+          <a:fontRef idx="minor">
+            <a:schemeClr val="lt1"/>
+          </a:fontRef>
+        </p:style>
+        <p:txBody>
+          <a:bodyPr lIns="0" tIns="0" rIns="0" bIns="0" rtlCol="0" anchor="ctr"/>
+          <a:lstStyle/>
+          <a:p>
+            <a:pPr algn="ctr"/>
+            <a:r>
+              <a:rPr lang="de-CH" sz="1300" dirty="0" smtClean="0">
+                <a:solidFill>
+                  <a:srgbClr val="333333"/>
+                </a:solidFill>
+                <a:latin typeface="Arial" panose="020B0604020202020204" pitchFamily="34" charset="0"/>
+                <a:cs typeface="Arial" panose="020B0604020202020204" pitchFamily="34" charset="0"/>
+              </a:rPr>
+              <a:t>Neue Eingangskommunikation</a:t>
+            </a:r>
+            <a:endParaRPr lang="de-CH" sz="1300" dirty="0">
+              <a:solidFill>
+                <a:srgbClr val="333333"/>
+              </a:solidFill>
+            </a:endParaRPr>
+          </a:p>
+        </p:txBody>
+      </p:sp>
     </p:spTree>
     <p:extLst>
       <p:ext uri="{BB962C8B-B14F-4D97-AF65-F5344CB8AC3E}">
@@ -41392,27 +41452,7 @@
                   <a:latin typeface="Arial" panose="020B0604020202020204" pitchFamily="34" charset="0"/>
                   <a:cs typeface="Arial" panose="020B0604020202020204" pitchFamily="34" charset="0"/>
                 </a:rPr>
-                <a:t>Weitere </a:t>
-              </a:r>
-              <a:r>
-                <a:rPr lang="de-CH" sz="1300" u="sng" dirty="0" smtClean="0">
-                  <a:solidFill>
-                    <a:srgbClr val="666666"/>
-                  </a:solidFill>
-                  <a:latin typeface="Arial" panose="020B0604020202020204" pitchFamily="34" charset="0"/>
-                  <a:cs typeface="Arial" panose="020B0604020202020204" pitchFamily="34" charset="0"/>
-                </a:rPr>
-                <a:t>F</a:t>
-              </a:r>
-              <a:r>
-                <a:rPr lang="de-CH" sz="1300" dirty="0" smtClean="0">
-                  <a:solidFill>
-                    <a:srgbClr val="666666"/>
-                  </a:solidFill>
-                  <a:latin typeface="Arial" panose="020B0604020202020204" pitchFamily="34" charset="0"/>
-                  <a:cs typeface="Arial" panose="020B0604020202020204" pitchFamily="34" charset="0"/>
-                </a:rPr>
-                <a:t>unktionen</a:t>
+                <a:t>Weitere Funktionen</a:t>
               </a:r>
               <a:endParaRPr lang="de-CH" sz="1300" dirty="0">
                 <a:solidFill>
@@ -41711,18 +41751,11 @@
           <a:p>
             <a:pPr algn="ctr"/>
             <a:r>
-              <a:rPr lang="de-CH" sz="1300" b="1" u="sng" dirty="0">
-                <a:latin typeface="Arial" panose="020B0604020202020204" pitchFamily="34" charset="0"/>
-                <a:cs typeface="Arial" panose="020B0604020202020204" pitchFamily="34" charset="0"/>
-              </a:rPr>
-              <a:t>W</a:t>
-            </a:r>
-            <a:r>
               <a:rPr lang="de-CH" sz="1300" b="1" dirty="0">
                 <a:latin typeface="Arial" panose="020B0604020202020204" pitchFamily="34" charset="0"/>
                 <a:cs typeface="Arial" panose="020B0604020202020204" pitchFamily="34" charset="0"/>
               </a:rPr>
-              <a:t>eiter</a:t>
+              <a:t>Weiter</a:t>
             </a:r>
             <a:r>
               <a:rPr lang="de-CH" sz="1300" b="1" dirty="0">
@@ -41812,24 +41845,14 @@
               <a:t> </a:t>
             </a:r>
             <a:r>
-              <a:rPr lang="de-CH" sz="1300" u="sng" dirty="0">
+              <a:rPr lang="de-CH" sz="1300" dirty="0">
                 <a:solidFill>
                   <a:srgbClr val="333333"/>
                 </a:solidFill>
                 <a:latin typeface="Arial" panose="020B0604020202020204" pitchFamily="34" charset="0"/>
                 <a:cs typeface="Arial" panose="020B0604020202020204" pitchFamily="34" charset="0"/>
               </a:rPr>
-              <a:t>Z</a:t>
-            </a:r>
-            <a:r>
-              <a:rPr lang="de-CH" sz="1300" dirty="0">
-                <a:solidFill>
-                  <a:srgbClr val="333333"/>
-                </a:solidFill>
-                <a:latin typeface="Arial" panose="020B0604020202020204" pitchFamily="34" charset="0"/>
-                <a:cs typeface="Arial" panose="020B0604020202020204" pitchFamily="34" charset="0"/>
-              </a:rPr>
-              <a:t>urück</a:t>
+              <a:t>Zurück</a:t>
             </a:r>
             <a:endParaRPr lang="de-CH" sz="1300" dirty="0">
               <a:solidFill>
@@ -41893,27 +41916,7 @@
                 <a:latin typeface="Arial" panose="020B0604020202020204" pitchFamily="34" charset="0"/>
                 <a:cs typeface="Arial" panose="020B0604020202020204" pitchFamily="34" charset="0"/>
               </a:rPr>
-              <a:t>Wieder</a:t>
-            </a:r>
-            <a:r>
-              <a:rPr lang="de-CH" sz="1300" u="sng" dirty="0" smtClean="0">
-                <a:solidFill>
-                  <a:srgbClr val="333333"/>
-                </a:solidFill>
-                <a:latin typeface="Arial" panose="020B0604020202020204" pitchFamily="34" charset="0"/>
-                <a:cs typeface="Arial" panose="020B0604020202020204" pitchFamily="34" charset="0"/>
-              </a:rPr>
-              <a:t>v</a:t>
-            </a:r>
-            <a:r>
-              <a:rPr lang="de-CH" sz="1300" dirty="0" smtClean="0">
-                <a:solidFill>
-                  <a:srgbClr val="333333"/>
-                </a:solidFill>
-                <a:latin typeface="Arial" panose="020B0604020202020204" pitchFamily="34" charset="0"/>
-                <a:cs typeface="Arial" panose="020B0604020202020204" pitchFamily="34" charset="0"/>
-              </a:rPr>
-              <a:t>orlage</a:t>
+              <a:t>Wiedervorlage</a:t>
             </a:r>
             <a:r>
               <a:rPr lang="de-CH" sz="1300" b="1" dirty="0">
@@ -42095,7 +42098,7 @@
         </p:blipFill>
         <p:spPr>
           <a:xfrm>
-            <a:off x="10604136" y="4678048"/>
+            <a:off x="10618650" y="4678048"/>
             <a:ext cx="414712" cy="414712"/>
           </a:xfrm>
           <a:prstGeom prst="rect">
@@ -42175,7 +42178,7 @@
                 </a:solidFill>
                 <a:latin typeface="FontAwesome" pitchFamily="50" charset="0"/>
               </a:rPr>
-              <a:t></a:t>
+              <a:t></a:t>
             </a:r>
             <a:endParaRPr lang="de-CH" sz="3600" dirty="0">
               <a:solidFill>
@@ -43119,13 +43122,6 @@
               </a:rPr>
               <a:t>Am Telefon mit</a:t>
             </a:r>
-            <a:endParaRPr lang="de-CH" sz="1600" dirty="0" smtClean="0">
-              <a:solidFill>
-                <a:srgbClr val="006C86"/>
-              </a:solidFill>
-              <a:latin typeface="Arial" panose="020B0604020202020204" pitchFamily="34" charset="0"/>
-              <a:cs typeface="Arial" panose="020B0604020202020204" pitchFamily="34" charset="0"/>
-            </a:endParaRPr>
           </a:p>
           <a:p>
             <a:r>
@@ -43212,7 +43208,7 @@
         </p:nvSpPr>
         <p:spPr>
           <a:xfrm>
-            <a:off x="4338719" y="1970865"/>
+            <a:off x="5137645" y="1970865"/>
             <a:ext cx="1427875" cy="28800"/>
           </a:xfrm>
           <a:prstGeom prst="rect">
@@ -43346,8 +43342,8 @@
         </p:nvSpPr>
         <p:spPr>
           <a:xfrm>
-            <a:off x="4369055" y="1629477"/>
-            <a:ext cx="2148100" cy="307777"/>
+            <a:off x="5167981" y="1629477"/>
+            <a:ext cx="1491358" cy="307777"/>
           </a:xfrm>
           <a:prstGeom prst="rect">
             <a:avLst/>
@@ -43806,27 +43802,17 @@
                 <a:latin typeface="Arial" panose="020B0604020202020204" pitchFamily="34" charset="0"/>
                 <a:cs typeface="Arial" panose="020B0604020202020204" pitchFamily="34" charset="0"/>
               </a:rPr>
-              <a:t>Neues Dokument…   Aus Zwischenablage </a:t>
-            </a:r>
-            <a:r>
-              <a:rPr lang="de-CH" sz="1300" dirty="0" err="1" smtClean="0">
+              <a:t>Neues Dokument…   </a:t>
+            </a:r>
+            <a:r>
+              <a:rPr lang="de-CH" sz="1300" dirty="0" smtClean="0">
                 <a:solidFill>
                   <a:srgbClr val="333333"/>
                 </a:solidFill>
                 <a:latin typeface="Arial" panose="020B0604020202020204" pitchFamily="34" charset="0"/>
                 <a:cs typeface="Arial" panose="020B0604020202020204" pitchFamily="34" charset="0"/>
               </a:rPr>
-              <a:t>einfüg</a:t>
-            </a:r>
-            <a:r>
-              <a:rPr lang="de-CH" sz="1300" dirty="0" smtClean="0">
-                <a:solidFill>
-                  <a:srgbClr val="333333"/>
-                </a:solidFill>
-                <a:latin typeface="Arial" panose="020B0604020202020204" pitchFamily="34" charset="0"/>
-                <a:cs typeface="Arial" panose="020B0604020202020204" pitchFamily="34" charset="0"/>
-              </a:rPr>
-              <a:t>…</a:t>
+              <a:t>Weitere Funktionen</a:t>
             </a:r>
             <a:endParaRPr lang="de-CH" sz="1300" dirty="0">
               <a:solidFill>
@@ -44346,25 +44332,8 @@
                 <a:latin typeface="Arial" panose="020B0604020202020204" pitchFamily="34" charset="0"/>
                 <a:cs typeface="Arial" panose="020B0604020202020204" pitchFamily="34" charset="0"/>
               </a:rPr>
-              <a:t>15.02</a:t>
-            </a:r>
-            <a:r>
-              <a:rPr lang="de-CH" sz="1300" dirty="0">
-                <a:solidFill>
-                  <a:srgbClr val="666666"/>
-                </a:solidFill>
-                <a:latin typeface="Arial" panose="020B0604020202020204" pitchFamily="34" charset="0"/>
-                <a:cs typeface="Arial" panose="020B0604020202020204" pitchFamily="34" charset="0"/>
-              </a:rPr>
-              <a:t>….</a:t>
-            </a:r>
-            <a:endParaRPr lang="de-CH" sz="1300" dirty="0">
-              <a:solidFill>
-                <a:srgbClr val="666666"/>
-              </a:solidFill>
-              <a:latin typeface="Arial" panose="020B0604020202020204" pitchFamily="34" charset="0"/>
-              <a:cs typeface="Arial" panose="020B0604020202020204" pitchFamily="34" charset="0"/>
-            </a:endParaRPr>
+              <a:t>15.02….</a:t>
+            </a:r>
           </a:p>
         </p:txBody>
       </p:sp>
@@ -44692,7 +44661,7 @@
         </p:nvSpPr>
         <p:spPr>
           <a:xfrm>
-            <a:off x="5757139" y="1629477"/>
+            <a:off x="6556065" y="1629477"/>
             <a:ext cx="2148100" cy="292388"/>
           </a:xfrm>
           <a:prstGeom prst="rect">
@@ -44758,6 +44727,529 @@
               <a:t>F8-Wizard</a:t>
             </a:r>
             <a:endParaRPr lang="de-CH" sz="1500" dirty="0">
+              <a:latin typeface="Arial" panose="020B0604020202020204" pitchFamily="34" charset="0"/>
+              <a:cs typeface="Arial" panose="020B0604020202020204" pitchFamily="34" charset="0"/>
+            </a:endParaRPr>
+          </a:p>
+        </p:txBody>
+      </p:sp>
+      <p:sp>
+        <p:nvSpPr>
+          <p:cNvPr id="88" name="Textfeld 87"/>
+          <p:cNvSpPr txBox="1"/>
+          <p:nvPr/>
+        </p:nvSpPr>
+        <p:spPr>
+          <a:xfrm>
+            <a:off x="4486959" y="1629477"/>
+            <a:ext cx="736444" cy="292388"/>
+          </a:xfrm>
+          <a:prstGeom prst="rect">
+            <a:avLst/>
+          </a:prstGeom>
+          <a:noFill/>
+        </p:spPr>
+        <p:txBody>
+          <a:bodyPr wrap="square" rtlCol="0">
+            <a:spAutoFit/>
+          </a:bodyPr>
+          <a:lstStyle/>
+          <a:p>
+            <a:r>
+              <a:rPr lang="de-CH" sz="1300" b="1" dirty="0" smtClean="0">
+                <a:solidFill>
+                  <a:srgbClr val="333333"/>
+                </a:solidFill>
+                <a:latin typeface="Arial" panose="020B0604020202020204" pitchFamily="34" charset="0"/>
+                <a:cs typeface="Arial" panose="020B0604020202020204" pitchFamily="34" charset="0"/>
+              </a:rPr>
+              <a:t>360°</a:t>
+            </a:r>
+            <a:endParaRPr lang="de-CH" sz="1300" b="1" dirty="0">
+              <a:solidFill>
+                <a:srgbClr val="333333"/>
+              </a:solidFill>
+              <a:latin typeface="Arial" panose="020B0604020202020204" pitchFamily="34" charset="0"/>
+              <a:cs typeface="Arial" panose="020B0604020202020204" pitchFamily="34" charset="0"/>
+            </a:endParaRPr>
+          </a:p>
+        </p:txBody>
+      </p:sp>
+      <p:sp>
+        <p:nvSpPr>
+          <p:cNvPr id="89" name="Rechteck 88"/>
+          <p:cNvSpPr/>
+          <p:nvPr/>
+        </p:nvSpPr>
+        <p:spPr>
+          <a:xfrm>
+            <a:off x="3147952" y="1970865"/>
+            <a:ext cx="1991015" cy="28800"/>
+          </a:xfrm>
+          <a:prstGeom prst="rect">
+            <a:avLst/>
+          </a:prstGeom>
+          <a:solidFill>
+            <a:srgbClr val="999999"/>
+          </a:solidFill>
+          <a:ln>
+            <a:noFill/>
+          </a:ln>
+        </p:spPr>
+        <p:style>
+          <a:lnRef idx="2">
+            <a:schemeClr val="accent1">
+              <a:shade val="50000"/>
+            </a:schemeClr>
+          </a:lnRef>
+          <a:fillRef idx="1">
+            <a:schemeClr val="accent1"/>
+          </a:fillRef>
+          <a:effectRef idx="0">
+            <a:schemeClr val="accent1"/>
+          </a:effectRef>
+          <a:fontRef idx="minor">
+            <a:schemeClr val="lt1"/>
+          </a:fontRef>
+        </p:style>
+        <p:txBody>
+          <a:bodyPr rtlCol="0" anchor="ctr"/>
+          <a:lstStyle/>
+          <a:p>
+            <a:pPr algn="ctr"/>
+            <a:endParaRPr lang="de-CH"/>
+          </a:p>
+        </p:txBody>
+      </p:sp>
+      <p:sp>
+        <p:nvSpPr>
+          <p:cNvPr id="90" name="Textfeld 89"/>
+          <p:cNvSpPr txBox="1"/>
+          <p:nvPr/>
+        </p:nvSpPr>
+        <p:spPr>
+          <a:xfrm>
+            <a:off x="16164395" y="10849743"/>
+            <a:ext cx="648072" cy="624605"/>
+          </a:xfrm>
+          <a:prstGeom prst="rect">
+            <a:avLst/>
+          </a:prstGeom>
+          <a:noFill/>
+        </p:spPr>
+        <p:txBody>
+          <a:bodyPr wrap="square" rtlCol="0" anchor="ctr">
+            <a:noAutofit/>
+          </a:bodyPr>
+          <a:lstStyle/>
+          <a:p>
+            <a:pPr algn="ctr"/>
+            <a:r>
+              <a:rPr lang="de-CH" sz="1800" dirty="0">
+                <a:solidFill>
+                  <a:srgbClr val="666666"/>
+                </a:solidFill>
+                <a:latin typeface="FontAwesome" pitchFamily="50" charset="0"/>
+              </a:rPr>
+              <a:t></a:t>
+            </a:r>
+            <a:endParaRPr lang="de-CH" sz="1200" dirty="0">
+              <a:solidFill>
+                <a:srgbClr val="666666"/>
+              </a:solidFill>
+              <a:latin typeface="Arial" panose="020B0604020202020204" pitchFamily="34" charset="0"/>
+              <a:cs typeface="Arial" panose="020B0604020202020204" pitchFamily="34" charset="0"/>
+            </a:endParaRPr>
+          </a:p>
+        </p:txBody>
+      </p:sp>
+      <p:sp>
+        <p:nvSpPr>
+          <p:cNvPr id="2" name="Abgerundetes Rechteck 1"/>
+          <p:cNvSpPr/>
+          <p:nvPr/>
+        </p:nvSpPr>
+        <p:spPr>
+          <a:xfrm>
+            <a:off x="2647895" y="2977400"/>
+            <a:ext cx="246024" cy="246024"/>
+          </a:xfrm>
+          <a:prstGeom prst="roundRect">
+            <a:avLst/>
+          </a:prstGeom>
+          <a:solidFill>
+            <a:schemeClr val="bg1"/>
+          </a:solidFill>
+          <a:ln>
+            <a:solidFill>
+              <a:srgbClr val="CCCCCC"/>
+            </a:solidFill>
+          </a:ln>
+        </p:spPr>
+        <p:style>
+          <a:lnRef idx="2">
+            <a:schemeClr val="accent1">
+              <a:shade val="50000"/>
+            </a:schemeClr>
+          </a:lnRef>
+          <a:fillRef idx="1">
+            <a:schemeClr val="accent1"/>
+          </a:fillRef>
+          <a:effectRef idx="0">
+            <a:schemeClr val="accent1"/>
+          </a:effectRef>
+          <a:fontRef idx="minor">
+            <a:schemeClr val="lt1"/>
+          </a:fontRef>
+        </p:style>
+        <p:txBody>
+          <a:bodyPr rtlCol="0" anchor="ctr"/>
+          <a:lstStyle/>
+          <a:p>
+            <a:pPr algn="ctr"/>
+            <a:endParaRPr lang="de-CH"/>
+          </a:p>
+        </p:txBody>
+      </p:sp>
+      <p:sp>
+        <p:nvSpPr>
+          <p:cNvPr id="91" name="Textfeld 90"/>
+          <p:cNvSpPr txBox="1"/>
+          <p:nvPr/>
+        </p:nvSpPr>
+        <p:spPr>
+          <a:xfrm>
+            <a:off x="2389213" y="2949690"/>
+            <a:ext cx="313753" cy="307777"/>
+          </a:xfrm>
+          <a:prstGeom prst="rect">
+            <a:avLst/>
+          </a:prstGeom>
+          <a:noFill/>
+        </p:spPr>
+        <p:txBody>
+          <a:bodyPr wrap="square" rtlCol="0">
+            <a:spAutoFit/>
+          </a:bodyPr>
+          <a:lstStyle/>
+          <a:p>
+            <a:r>
+              <a:rPr lang="de-CH" sz="1400" b="1" dirty="0" smtClean="0">
+                <a:solidFill>
+                  <a:srgbClr val="CCCCCC"/>
+                </a:solidFill>
+                <a:latin typeface="FontAwesome" pitchFamily="50" charset="0"/>
+              </a:rPr>
+              <a:t></a:t>
+            </a:r>
+            <a:endParaRPr lang="de-CH" sz="1300" b="1" dirty="0">
+              <a:solidFill>
+                <a:srgbClr val="CCCCCC"/>
+              </a:solidFill>
+              <a:latin typeface="Arial" panose="020B0604020202020204" pitchFamily="34" charset="0"/>
+              <a:cs typeface="Arial" panose="020B0604020202020204" pitchFamily="34" charset="0"/>
+            </a:endParaRPr>
+          </a:p>
+        </p:txBody>
+      </p:sp>
+      <p:sp>
+        <p:nvSpPr>
+          <p:cNvPr id="92" name="Textfeld 91"/>
+          <p:cNvSpPr txBox="1"/>
+          <p:nvPr/>
+        </p:nvSpPr>
+        <p:spPr>
+          <a:xfrm>
+            <a:off x="2932821" y="2965634"/>
+            <a:ext cx="1491358" cy="292388"/>
+          </a:xfrm>
+          <a:prstGeom prst="rect">
+            <a:avLst/>
+          </a:prstGeom>
+          <a:noFill/>
+        </p:spPr>
+        <p:txBody>
+          <a:bodyPr wrap="square" rtlCol="0">
+            <a:spAutoFit/>
+          </a:bodyPr>
+          <a:lstStyle/>
+          <a:p>
+            <a:r>
+              <a:rPr lang="de-CH" sz="1300" dirty="0" smtClean="0">
+                <a:solidFill>
+                  <a:srgbClr val="333333"/>
+                </a:solidFill>
+                <a:latin typeface="Arial" panose="020B0604020202020204" pitchFamily="34" charset="0"/>
+                <a:cs typeface="Arial" panose="020B0604020202020204" pitchFamily="34" charset="0"/>
+              </a:rPr>
+              <a:t>Kundenservice</a:t>
+            </a:r>
+            <a:endParaRPr lang="de-CH" sz="1300" dirty="0">
+              <a:solidFill>
+                <a:srgbClr val="333333"/>
+              </a:solidFill>
+              <a:latin typeface="Arial" panose="020B0604020202020204" pitchFamily="34" charset="0"/>
+              <a:cs typeface="Arial" panose="020B0604020202020204" pitchFamily="34" charset="0"/>
+            </a:endParaRPr>
+          </a:p>
+        </p:txBody>
+      </p:sp>
+      <p:sp>
+        <p:nvSpPr>
+          <p:cNvPr id="93" name="Abgerundetes Rechteck 92"/>
+          <p:cNvSpPr/>
+          <p:nvPr/>
+        </p:nvSpPr>
+        <p:spPr>
+          <a:xfrm>
+            <a:off x="2904757" y="3364237"/>
+            <a:ext cx="246024" cy="246024"/>
+          </a:xfrm>
+          <a:prstGeom prst="roundRect">
+            <a:avLst/>
+          </a:prstGeom>
+          <a:solidFill>
+            <a:schemeClr val="bg1"/>
+          </a:solidFill>
+          <a:ln>
+            <a:solidFill>
+              <a:srgbClr val="CCCCCC"/>
+            </a:solidFill>
+          </a:ln>
+        </p:spPr>
+        <p:style>
+          <a:lnRef idx="2">
+            <a:schemeClr val="accent1">
+              <a:shade val="50000"/>
+            </a:schemeClr>
+          </a:lnRef>
+          <a:fillRef idx="1">
+            <a:schemeClr val="accent1"/>
+          </a:fillRef>
+          <a:effectRef idx="0">
+            <a:schemeClr val="accent1"/>
+          </a:effectRef>
+          <a:fontRef idx="minor">
+            <a:schemeClr val="lt1"/>
+          </a:fontRef>
+        </p:style>
+        <p:txBody>
+          <a:bodyPr rtlCol="0" anchor="ctr"/>
+          <a:lstStyle/>
+          <a:p>
+            <a:pPr algn="ctr"/>
+            <a:endParaRPr lang="de-CH"/>
+          </a:p>
+        </p:txBody>
+      </p:sp>
+      <p:sp>
+        <p:nvSpPr>
+          <p:cNvPr id="94" name="Textfeld 93"/>
+          <p:cNvSpPr txBox="1"/>
+          <p:nvPr/>
+        </p:nvSpPr>
+        <p:spPr>
+          <a:xfrm>
+            <a:off x="2646075" y="3336527"/>
+            <a:ext cx="313753" cy="307777"/>
+          </a:xfrm>
+          <a:prstGeom prst="rect">
+            <a:avLst/>
+          </a:prstGeom>
+          <a:noFill/>
+        </p:spPr>
+        <p:txBody>
+          <a:bodyPr wrap="square" rtlCol="0">
+            <a:spAutoFit/>
+          </a:bodyPr>
+          <a:lstStyle/>
+          <a:p>
+            <a:r>
+              <a:rPr lang="de-CH" sz="1400" b="1" dirty="0" smtClean="0">
+                <a:solidFill>
+                  <a:srgbClr val="CCCCCC"/>
+                </a:solidFill>
+                <a:latin typeface="FontAwesome" pitchFamily="50" charset="0"/>
+              </a:rPr>
+              <a:t></a:t>
+            </a:r>
+            <a:endParaRPr lang="de-CH" sz="1300" b="1" dirty="0">
+              <a:solidFill>
+                <a:srgbClr val="CCCCCC"/>
+              </a:solidFill>
+              <a:latin typeface="Arial" panose="020B0604020202020204" pitchFamily="34" charset="0"/>
+              <a:cs typeface="Arial" panose="020B0604020202020204" pitchFamily="34" charset="0"/>
+            </a:endParaRPr>
+          </a:p>
+        </p:txBody>
+      </p:sp>
+      <p:sp>
+        <p:nvSpPr>
+          <p:cNvPr id="95" name="Textfeld 94"/>
+          <p:cNvSpPr txBox="1"/>
+          <p:nvPr/>
+        </p:nvSpPr>
+        <p:spPr>
+          <a:xfrm>
+            <a:off x="3189683" y="3352471"/>
+            <a:ext cx="1491358" cy="292388"/>
+          </a:xfrm>
+          <a:prstGeom prst="rect">
+            <a:avLst/>
+          </a:prstGeom>
+          <a:noFill/>
+        </p:spPr>
+        <p:txBody>
+          <a:bodyPr wrap="square" rtlCol="0">
+            <a:spAutoFit/>
+          </a:bodyPr>
+          <a:lstStyle/>
+          <a:p>
+            <a:r>
+              <a:rPr lang="de-CH" sz="1300" dirty="0" smtClean="0">
+                <a:solidFill>
+                  <a:srgbClr val="333333"/>
+                </a:solidFill>
+                <a:latin typeface="Arial" panose="020B0604020202020204" pitchFamily="34" charset="0"/>
+                <a:cs typeface="Arial" panose="020B0604020202020204" pitchFamily="34" charset="0"/>
+              </a:rPr>
+              <a:t>Adresse ändern</a:t>
+            </a:r>
+            <a:endParaRPr lang="de-CH" sz="1300" dirty="0">
+              <a:solidFill>
+                <a:srgbClr val="333333"/>
+              </a:solidFill>
+              <a:latin typeface="Arial" panose="020B0604020202020204" pitchFamily="34" charset="0"/>
+              <a:cs typeface="Arial" panose="020B0604020202020204" pitchFamily="34" charset="0"/>
+            </a:endParaRPr>
+          </a:p>
+        </p:txBody>
+      </p:sp>
+      <p:sp>
+        <p:nvSpPr>
+          <p:cNvPr id="100" name="Abgerundetes Rechteck 99"/>
+          <p:cNvSpPr/>
+          <p:nvPr/>
+        </p:nvSpPr>
+        <p:spPr>
+          <a:xfrm>
+            <a:off x="2904757" y="3779376"/>
+            <a:ext cx="246024" cy="246024"/>
+          </a:xfrm>
+          <a:prstGeom prst="roundRect">
+            <a:avLst/>
+          </a:prstGeom>
+          <a:solidFill>
+            <a:schemeClr val="bg1"/>
+          </a:solidFill>
+          <a:ln>
+            <a:solidFill>
+              <a:srgbClr val="CCCCCC"/>
+            </a:solidFill>
+          </a:ln>
+        </p:spPr>
+        <p:style>
+          <a:lnRef idx="2">
+            <a:schemeClr val="accent1">
+              <a:shade val="50000"/>
+            </a:schemeClr>
+          </a:lnRef>
+          <a:fillRef idx="1">
+            <a:schemeClr val="accent1"/>
+          </a:fillRef>
+          <a:effectRef idx="0">
+            <a:schemeClr val="accent1"/>
+          </a:effectRef>
+          <a:fontRef idx="minor">
+            <a:schemeClr val="lt1"/>
+          </a:fontRef>
+        </p:style>
+        <p:txBody>
+          <a:bodyPr rtlCol="0" anchor="ctr"/>
+          <a:lstStyle/>
+          <a:p>
+            <a:pPr algn="ctr"/>
+            <a:endParaRPr lang="de-CH"/>
+          </a:p>
+        </p:txBody>
+      </p:sp>
+      <p:sp>
+        <p:nvSpPr>
+          <p:cNvPr id="101" name="Textfeld 100"/>
+          <p:cNvSpPr txBox="1"/>
+          <p:nvPr/>
+        </p:nvSpPr>
+        <p:spPr>
+          <a:xfrm>
+            <a:off x="2646075" y="3751666"/>
+            <a:ext cx="313753" cy="307777"/>
+          </a:xfrm>
+          <a:prstGeom prst="rect">
+            <a:avLst/>
+          </a:prstGeom>
+          <a:noFill/>
+        </p:spPr>
+        <p:txBody>
+          <a:bodyPr wrap="square" rtlCol="0">
+            <a:spAutoFit/>
+          </a:bodyPr>
+          <a:lstStyle/>
+          <a:p>
+            <a:r>
+              <a:rPr lang="de-CH" sz="1400" b="1" dirty="0" smtClean="0">
+                <a:solidFill>
+                  <a:srgbClr val="CCCCCC"/>
+                </a:solidFill>
+                <a:latin typeface="FontAwesome" pitchFamily="50" charset="0"/>
+              </a:rPr>
+              <a:t></a:t>
+            </a:r>
+            <a:endParaRPr lang="de-CH" sz="1300" b="1" dirty="0">
+              <a:solidFill>
+                <a:srgbClr val="CCCCCC"/>
+              </a:solidFill>
+              <a:latin typeface="Arial" panose="020B0604020202020204" pitchFamily="34" charset="0"/>
+              <a:cs typeface="Arial" panose="020B0604020202020204" pitchFamily="34" charset="0"/>
+            </a:endParaRPr>
+          </a:p>
+        </p:txBody>
+      </p:sp>
+      <p:sp>
+        <p:nvSpPr>
+          <p:cNvPr id="102" name="Textfeld 101"/>
+          <p:cNvSpPr txBox="1"/>
+          <p:nvPr/>
+        </p:nvSpPr>
+        <p:spPr>
+          <a:xfrm>
+            <a:off x="3189683" y="3767610"/>
+            <a:ext cx="1491358" cy="292388"/>
+          </a:xfrm>
+          <a:prstGeom prst="rect">
+            <a:avLst/>
+          </a:prstGeom>
+          <a:noFill/>
+        </p:spPr>
+        <p:txBody>
+          <a:bodyPr wrap="square" rtlCol="0">
+            <a:spAutoFit/>
+          </a:bodyPr>
+          <a:lstStyle/>
+          <a:p>
+            <a:r>
+              <a:rPr lang="de-CH" sz="1300" dirty="0" smtClean="0">
+                <a:solidFill>
+                  <a:srgbClr val="333333"/>
+                </a:solidFill>
+                <a:latin typeface="Arial" panose="020B0604020202020204" pitchFamily="34" charset="0"/>
+                <a:cs typeface="Arial" panose="020B0604020202020204" pitchFamily="34" charset="0"/>
+              </a:rPr>
+              <a:t>Bestellerfassung</a:t>
+            </a:r>
+            <a:endParaRPr lang="de-CH" sz="1300" dirty="0">
+              <a:solidFill>
+                <a:srgbClr val="333333"/>
+              </a:solidFill>
               <a:latin typeface="Arial" panose="020B0604020202020204" pitchFamily="34" charset="0"/>
               <a:cs typeface="Arial" panose="020B0604020202020204" pitchFamily="34" charset="0"/>
             </a:endParaRPr>
@@ -45851,27 +46343,7 @@
                   <a:latin typeface="Arial" panose="020B0604020202020204" pitchFamily="34" charset="0"/>
                   <a:cs typeface="Arial" panose="020B0604020202020204" pitchFamily="34" charset="0"/>
                 </a:rPr>
-                <a:t>Weitere </a:t>
-              </a:r>
-              <a:r>
-                <a:rPr lang="de-CH" sz="1300" u="sng" dirty="0" smtClean="0">
-                  <a:solidFill>
-                    <a:srgbClr val="666666"/>
-                  </a:solidFill>
-                  <a:latin typeface="Arial" panose="020B0604020202020204" pitchFamily="34" charset="0"/>
-                  <a:cs typeface="Arial" panose="020B0604020202020204" pitchFamily="34" charset="0"/>
-                </a:rPr>
-                <a:t>F</a:t>
-              </a:r>
-              <a:r>
-                <a:rPr lang="de-CH" sz="1300" dirty="0" smtClean="0">
-                  <a:solidFill>
-                    <a:srgbClr val="666666"/>
-                  </a:solidFill>
-                  <a:latin typeface="Arial" panose="020B0604020202020204" pitchFamily="34" charset="0"/>
-                  <a:cs typeface="Arial" panose="020B0604020202020204" pitchFamily="34" charset="0"/>
-                </a:rPr>
-                <a:t>unktionen</a:t>
+                <a:t>Weitere Funktionen</a:t>
               </a:r>
               <a:endParaRPr lang="de-CH" sz="1300" dirty="0">
                 <a:solidFill>
@@ -47306,18 +47778,11 @@
           <a:p>
             <a:pPr algn="ctr"/>
             <a:r>
-              <a:rPr lang="de-CH" sz="1300" b="1" u="sng" dirty="0">
-                <a:latin typeface="Arial" panose="020B0604020202020204" pitchFamily="34" charset="0"/>
-                <a:cs typeface="Arial" panose="020B0604020202020204" pitchFamily="34" charset="0"/>
-              </a:rPr>
-              <a:t>W</a:t>
-            </a:r>
-            <a:r>
               <a:rPr lang="de-CH" sz="1300" b="1" dirty="0">
                 <a:latin typeface="Arial" panose="020B0604020202020204" pitchFamily="34" charset="0"/>
                 <a:cs typeface="Arial" panose="020B0604020202020204" pitchFamily="34" charset="0"/>
               </a:rPr>
-              <a:t>eiter</a:t>
+              <a:t>Weiter</a:t>
             </a:r>
             <a:r>
               <a:rPr lang="de-CH" sz="1300" b="1" dirty="0">
@@ -47407,24 +47872,14 @@
               <a:t> </a:t>
             </a:r>
             <a:r>
-              <a:rPr lang="de-CH" sz="1300" u="sng" dirty="0">
+              <a:rPr lang="de-CH" sz="1300" dirty="0">
                 <a:solidFill>
                   <a:srgbClr val="333333"/>
                 </a:solidFill>
                 <a:latin typeface="Arial" panose="020B0604020202020204" pitchFamily="34" charset="0"/>
                 <a:cs typeface="Arial" panose="020B0604020202020204" pitchFamily="34" charset="0"/>
               </a:rPr>
-              <a:t>Z</a:t>
-            </a:r>
-            <a:r>
-              <a:rPr lang="de-CH" sz="1300" dirty="0">
-                <a:solidFill>
-                  <a:srgbClr val="333333"/>
-                </a:solidFill>
-                <a:latin typeface="Arial" panose="020B0604020202020204" pitchFamily="34" charset="0"/>
-                <a:cs typeface="Arial" panose="020B0604020202020204" pitchFamily="34" charset="0"/>
-              </a:rPr>
-              <a:t>urück</a:t>
+              <a:t>Zurück</a:t>
             </a:r>
             <a:endParaRPr lang="de-CH" sz="1300" dirty="0">
               <a:solidFill>
@@ -47488,27 +47943,7 @@
                 <a:latin typeface="Arial" panose="020B0604020202020204" pitchFamily="34" charset="0"/>
                 <a:cs typeface="Arial" panose="020B0604020202020204" pitchFamily="34" charset="0"/>
               </a:rPr>
-              <a:t>Wieder</a:t>
-            </a:r>
-            <a:r>
-              <a:rPr lang="de-CH" sz="1300" u="sng" dirty="0" smtClean="0">
-                <a:solidFill>
-                  <a:srgbClr val="333333"/>
-                </a:solidFill>
-                <a:latin typeface="Arial" panose="020B0604020202020204" pitchFamily="34" charset="0"/>
-                <a:cs typeface="Arial" panose="020B0604020202020204" pitchFamily="34" charset="0"/>
-              </a:rPr>
-              <a:t>v</a:t>
-            </a:r>
-            <a:r>
-              <a:rPr lang="de-CH" sz="1300" dirty="0" smtClean="0">
-                <a:solidFill>
-                  <a:srgbClr val="333333"/>
-                </a:solidFill>
-                <a:latin typeface="Arial" panose="020B0604020202020204" pitchFamily="34" charset="0"/>
-                <a:cs typeface="Arial" panose="020B0604020202020204" pitchFamily="34" charset="0"/>
-              </a:rPr>
-              <a:t>orlage</a:t>
+              <a:t>Wiedervorlage</a:t>
             </a:r>
             <a:r>
               <a:rPr lang="de-CH" sz="1300" b="1" dirty="0">

</xml_diff>